<commit_message>
fix: small errors Readme slides_module_1
</commit_message>
<xml_diff>
--- a/session_1/slides/slides_module_1.pptx
+++ b/session_1/slides/slides_module_1.pptx
@@ -294,8 +294,7 @@
 <file path=ppt/revisionInfo.xml><?xml version="1.0" encoding="utf-8"?>
 <p1510:revInfo xmlns:a="http://schemas.openxmlformats.org/drawingml/2006/main" xmlns:r="http://schemas.openxmlformats.org/officeDocument/2006/relationships" xmlns:p1510="http://schemas.microsoft.com/office/powerpoint/2015/10/main">
   <p1510:revLst>
-    <p1510:client id="{14CE2944-8739-4012-B97C-9A9A8C8E675E}" v="14" dt="2024-07-01T08:48:28.267"/>
-    <p1510:client id="{D4C4542F-1DA7-4F8A-9783-933C3C83297E}" v="4" dt="2024-07-01T14:56:57.663"/>
+    <p1510:client id="{D4C4542F-1DA7-4F8A-9783-933C3C83297E}" v="5" dt="2024-07-05T07:09:48.400"/>
   </p1510:revLst>
 </p1510:revInfo>
 </file>
@@ -305,7 +304,7 @@
   <pc:docChgLst>
     <pc:chgData name="Lena Gschossmann" userId="bfd8fa5b3c2be1bd" providerId="LiveId" clId="{D4C4542F-1DA7-4F8A-9783-933C3C83297E}"/>
     <pc:docChg chg="undo custSel addSld delSld modSld">
-      <pc:chgData name="Lena Gschossmann" userId="bfd8fa5b3c2be1bd" providerId="LiveId" clId="{D4C4542F-1DA7-4F8A-9783-933C3C83297E}" dt="2024-07-01T14:58:15.417" v="289" actId="1037"/>
+      <pc:chgData name="Lena Gschossmann" userId="bfd8fa5b3c2be1bd" providerId="LiveId" clId="{D4C4542F-1DA7-4F8A-9783-933C3C83297E}" dt="2024-07-05T07:10:21.584" v="320" actId="114"/>
       <pc:docMkLst>
         <pc:docMk/>
       </pc:docMkLst>
@@ -352,7 +351,7 @@
         </pc:sldMkLst>
       </pc:sldChg>
       <pc:sldChg chg="addSp delSp modSp mod">
-        <pc:chgData name="Lena Gschossmann" userId="bfd8fa5b3c2be1bd" providerId="LiveId" clId="{D4C4542F-1DA7-4F8A-9783-933C3C83297E}" dt="2024-07-01T14:58:15.417" v="289" actId="1037"/>
+        <pc:chgData name="Lena Gschossmann" userId="bfd8fa5b3c2be1bd" providerId="LiveId" clId="{D4C4542F-1DA7-4F8A-9783-933C3C83297E}" dt="2024-07-05T07:10:21.584" v="320" actId="114"/>
         <pc:sldMkLst>
           <pc:docMk/>
           <pc:sldMk cId="3264522944" sldId="267"/>
@@ -366,7 +365,7 @@
           </ac:spMkLst>
         </pc:spChg>
         <pc:spChg chg="mod">
-          <ac:chgData name="Lena Gschossmann" userId="bfd8fa5b3c2be1bd" providerId="LiveId" clId="{D4C4542F-1DA7-4F8A-9783-933C3C83297E}" dt="2024-07-01T09:04:25.348" v="209" actId="403"/>
+          <ac:chgData name="Lena Gschossmann" userId="bfd8fa5b3c2be1bd" providerId="LiveId" clId="{D4C4542F-1DA7-4F8A-9783-933C3C83297E}" dt="2024-07-05T07:10:21.584" v="320" actId="114"/>
           <ac:spMkLst>
             <pc:docMk/>
             <pc:sldMk cId="3264522944" sldId="267"/>
@@ -1214,7 +1213,7 @@
           <a:p>
             <a:fld id="{08ED1807-82C1-4858-9D6C-BFB2DF91AC9F}" type="datetimeFigureOut">
               <a:rPr lang="LID4096" smtClean="0"/>
-              <a:t>07/01/2024</a:t>
+              <a:t>07/05/2024</a:t>
             </a:fld>
             <a:endParaRPr lang="LID4096"/>
           </a:p>
@@ -5112,7 +5111,7 @@
               <a:rPr lang="de-DE" sz="4400">
                 <a:hlinkClick r:id="rId4"/>
               </a:rPr>
-              <a:t>https://github.com/IEECR/Github-Workshop</a:t>
+              <a:t>https://github.com/IEECR/Git-Github-Workshop/tree/main</a:t>
             </a:r>
             <a:endParaRPr lang="de-DE" sz="4400"/>
           </a:p>
@@ -5133,7 +5132,27 @@
             </a:pPr>
             <a:r>
               <a:rPr lang="de-DE" sz="4400" b="0"/>
-              <a:t>In the repository move to the folder „instructions“ and click on „module_1.txt“</a:t>
+              <a:t>In the repository move to the folder </a:t>
+            </a:r>
+            <a:r>
+              <a:rPr lang="de-DE" sz="4400" b="0" i="1"/>
+              <a:t>sessions_1</a:t>
+            </a:r>
+            <a:r>
+              <a:rPr lang="de-DE" sz="4400" b="0"/>
+              <a:t> &gt; </a:t>
+            </a:r>
+            <a:r>
+              <a:rPr lang="de-DE" sz="4400" b="0" i="1"/>
+              <a:t>instructions</a:t>
+            </a:r>
+            <a:r>
+              <a:rPr lang="de-DE" sz="4400" b="0"/>
+              <a:t> and click on </a:t>
+            </a:r>
+            <a:r>
+              <a:rPr lang="de-DE" sz="4400" b="0" i="1"/>
+              <a:t>module_1.md</a:t>
             </a:r>
           </a:p>
           <a:p>

</xml_diff>